<commit_message>
start int test, good precise searching
</commit_message>
<xml_diff>
--- a/notes/组会20220506.pptx
+++ b/notes/组会20220506.pptx
@@ -110,6 +110,11 @@
       </a:defRPr>
     </a:lvl9pPr>
   </p:defaultTextStyle>
+  <p:extLst>
+    <p:ext uri="{EFAFB233-063F-42B5-8137-9DF3F51BA10A}">
+      <p15:sldGuideLst xmlns:p15="http://schemas.microsoft.com/office/powerpoint/2012/main"/>
+    </p:ext>
+  </p:extLst>
 </p:presentation>
 </file>
 
@@ -260,7 +265,7 @@
           <a:p>
             <a:fld id="{3A4C8CEB-F8BF-416D-8039-AAA63E3D103E}" type="datetimeFigureOut">
               <a:rPr lang="zh-CN" altLang="en-US" smtClean="0"/>
-              <a:t>2022/5/5</a:t>
+              <a:t>2022/5/6</a:t>
             </a:fld>
             <a:endParaRPr lang="zh-CN" altLang="en-US"/>
           </a:p>
@@ -458,7 +463,7 @@
           <a:p>
             <a:fld id="{3A4C8CEB-F8BF-416D-8039-AAA63E3D103E}" type="datetimeFigureOut">
               <a:rPr lang="zh-CN" altLang="en-US" smtClean="0"/>
-              <a:t>2022/5/5</a:t>
+              <a:t>2022/5/6</a:t>
             </a:fld>
             <a:endParaRPr lang="zh-CN" altLang="en-US"/>
           </a:p>
@@ -666,7 +671,7 @@
           <a:p>
             <a:fld id="{3A4C8CEB-F8BF-416D-8039-AAA63E3D103E}" type="datetimeFigureOut">
               <a:rPr lang="zh-CN" altLang="en-US" smtClean="0"/>
-              <a:t>2022/5/5</a:t>
+              <a:t>2022/5/6</a:t>
             </a:fld>
             <a:endParaRPr lang="zh-CN" altLang="en-US"/>
           </a:p>
@@ -864,7 +869,7 @@
           <a:p>
             <a:fld id="{3A4C8CEB-F8BF-416D-8039-AAA63E3D103E}" type="datetimeFigureOut">
               <a:rPr lang="zh-CN" altLang="en-US" smtClean="0"/>
-              <a:t>2022/5/5</a:t>
+              <a:t>2022/5/6</a:t>
             </a:fld>
             <a:endParaRPr lang="zh-CN" altLang="en-US"/>
           </a:p>
@@ -1139,7 +1144,7 @@
           <a:p>
             <a:fld id="{3A4C8CEB-F8BF-416D-8039-AAA63E3D103E}" type="datetimeFigureOut">
               <a:rPr lang="zh-CN" altLang="en-US" smtClean="0"/>
-              <a:t>2022/5/5</a:t>
+              <a:t>2022/5/6</a:t>
             </a:fld>
             <a:endParaRPr lang="zh-CN" altLang="en-US"/>
           </a:p>
@@ -1404,7 +1409,7 @@
           <a:p>
             <a:fld id="{3A4C8CEB-F8BF-416D-8039-AAA63E3D103E}" type="datetimeFigureOut">
               <a:rPr lang="zh-CN" altLang="en-US" smtClean="0"/>
-              <a:t>2022/5/5</a:t>
+              <a:t>2022/5/6</a:t>
             </a:fld>
             <a:endParaRPr lang="zh-CN" altLang="en-US"/>
           </a:p>
@@ -1816,7 +1821,7 @@
           <a:p>
             <a:fld id="{3A4C8CEB-F8BF-416D-8039-AAA63E3D103E}" type="datetimeFigureOut">
               <a:rPr lang="zh-CN" altLang="en-US" smtClean="0"/>
-              <a:t>2022/5/5</a:t>
+              <a:t>2022/5/6</a:t>
             </a:fld>
             <a:endParaRPr lang="zh-CN" altLang="en-US"/>
           </a:p>
@@ -1957,7 +1962,7 @@
           <a:p>
             <a:fld id="{3A4C8CEB-F8BF-416D-8039-AAA63E3D103E}" type="datetimeFigureOut">
               <a:rPr lang="zh-CN" altLang="en-US" smtClean="0"/>
-              <a:t>2022/5/5</a:t>
+              <a:t>2022/5/6</a:t>
             </a:fld>
             <a:endParaRPr lang="zh-CN" altLang="en-US"/>
           </a:p>
@@ -2070,7 +2075,7 @@
           <a:p>
             <a:fld id="{3A4C8CEB-F8BF-416D-8039-AAA63E3D103E}" type="datetimeFigureOut">
               <a:rPr lang="zh-CN" altLang="en-US" smtClean="0"/>
-              <a:t>2022/5/5</a:t>
+              <a:t>2022/5/6</a:t>
             </a:fld>
             <a:endParaRPr lang="zh-CN" altLang="en-US"/>
           </a:p>
@@ -2381,7 +2386,7 @@
           <a:p>
             <a:fld id="{3A4C8CEB-F8BF-416D-8039-AAA63E3D103E}" type="datetimeFigureOut">
               <a:rPr lang="zh-CN" altLang="en-US" smtClean="0"/>
-              <a:t>2022/5/5</a:t>
+              <a:t>2022/5/6</a:t>
             </a:fld>
             <a:endParaRPr lang="zh-CN" altLang="en-US"/>
           </a:p>
@@ -2669,7 +2674,7 @@
           <a:p>
             <a:fld id="{3A4C8CEB-F8BF-416D-8039-AAA63E3D103E}" type="datetimeFigureOut">
               <a:rPr lang="zh-CN" altLang="en-US" smtClean="0"/>
-              <a:t>2022/5/5</a:t>
+              <a:t>2022/5/6</a:t>
             </a:fld>
             <a:endParaRPr lang="zh-CN" altLang="en-US"/>
           </a:p>
@@ -2910,7 +2915,7 @@
           <a:p>
             <a:fld id="{3A4C8CEB-F8BF-416D-8039-AAA63E3D103E}" type="datetimeFigureOut">
               <a:rPr lang="zh-CN" altLang="en-US" smtClean="0"/>
-              <a:t>2022/5/5</a:t>
+              <a:t>2022/5/6</a:t>
             </a:fld>
             <a:endParaRPr lang="zh-CN" altLang="en-US"/>
           </a:p>
@@ -3928,7 +3933,7 @@
           <p:nvPr>
             <p:extLst>
               <p:ext uri="{D42A27DB-BD31-4B8C-83A1-F6EECF244321}">
-                <p14:modId xmlns:p14="http://schemas.microsoft.com/office/powerpoint/2010/main" val="3077862124"/>
+                <p14:modId xmlns:p14="http://schemas.microsoft.com/office/powerpoint/2010/main" val="517961194"/>
               </p:ext>
             </p:extLst>
           </p:nvPr>
@@ -4053,9 +4058,10 @@
                     <a:p>
                       <a:pPr algn="ctr"/>
                       <a:r>
-                        <a:rPr lang="en-US" altLang="zh-CN" dirty="0"/>
-                        <a:t>2.9s</a:t>
-                      </a:r>
+                        <a:rPr lang="en-US" altLang="zh-CN"/>
+                        <a:t>3.3s </a:t>
+                      </a:r>
+                      <a:endParaRPr lang="en-US" altLang="zh-CN" dirty="0"/>
                     </a:p>
                   </a:txBody>
                   <a:tcPr/>
@@ -4102,26 +4108,10 @@
                     <a:bodyPr/>
                     <a:lstStyle/>
                     <a:p>
-                      <a:pPr marL="0" marR="0" lvl="0" indent="0" algn="ctr" defTabSz="914400" rtl="0" eaLnBrk="1" fontAlgn="auto" latinLnBrk="0" hangingPunct="1">
-                        <a:lnSpc>
-                          <a:spcPct val="100000"/>
-                        </a:lnSpc>
-                        <a:spcBef>
-                          <a:spcPts val="0"/>
-                        </a:spcBef>
-                        <a:spcAft>
-                          <a:spcPts val="0"/>
-                        </a:spcAft>
-                        <a:buClrTx/>
-                        <a:buSzTx/>
-                        <a:buFontTx/>
-                        <a:buNone/>
-                        <a:tabLst/>
-                        <a:defRPr/>
-                      </a:pPr>
-                      <a:r>
-                        <a:rPr lang="en-US" altLang="zh-CN" dirty="0"/>
-                        <a:t>1.65s</a:t>
+                      <a:pPr algn="ctr"/>
+                      <a:r>
+                        <a:rPr lang="en-US" altLang="zh-CN" dirty="0"/>
+                        <a:t>1.85s</a:t>
                       </a:r>
                     </a:p>
                   </a:txBody>
@@ -4169,28 +4159,11 @@
                     <a:bodyPr/>
                     <a:lstStyle/>
                     <a:p>
-                      <a:pPr marL="0" marR="0" lvl="0" indent="0" algn="ctr" defTabSz="914400" rtl="0" eaLnBrk="1" fontAlgn="auto" latinLnBrk="0" hangingPunct="1">
-                        <a:lnSpc>
-                          <a:spcPct val="100000"/>
-                        </a:lnSpc>
-                        <a:spcBef>
-                          <a:spcPts val="0"/>
-                        </a:spcBef>
-                        <a:spcAft>
-                          <a:spcPts val="0"/>
-                        </a:spcAft>
-                        <a:buClrTx/>
-                        <a:buSzTx/>
-                        <a:buFontTx/>
-                        <a:buNone/>
-                        <a:tabLst/>
-                        <a:defRPr/>
-                      </a:pPr>
-                      <a:r>
-                        <a:rPr lang="en-US" altLang="zh-CN" dirty="0"/>
-                        <a:t>0.83s</a:t>
-                      </a:r>
-                      <a:endParaRPr lang="zh-CN" altLang="en-US" dirty="0"/>
+                      <a:pPr algn="ctr"/>
+                      <a:r>
+                        <a:rPr lang="en-US" altLang="zh-CN" dirty="0"/>
+                        <a:t>1.3s</a:t>
+                      </a:r>
                     </a:p>
                   </a:txBody>
                   <a:tcPr/>
@@ -4323,8 +4296,8 @@
           </a:p>
         </p:txBody>
       </p:sp>
-      <mc:AlternateContent xmlns:mc="http://schemas.openxmlformats.org/markup-compatibility/2006">
-        <mc:Choice xmlns:a14="http://schemas.microsoft.com/office/drawing/2010/main" Requires="a14">
+      <mc:AlternateContent xmlns:mc="http://schemas.openxmlformats.org/markup-compatibility/2006" xmlns:a14="http://schemas.microsoft.com/office/drawing/2010/main">
+        <mc:Choice Requires="a14">
           <p:sp>
             <p:nvSpPr>
               <p:cNvPr id="20" name="文本框 19">
@@ -4716,7 +4689,7 @@
             </p:txBody>
           </p:sp>
         </mc:Choice>
-        <mc:Fallback>
+        <mc:Fallback xmlns="">
           <p:sp>
             <p:nvSpPr>
               <p:cNvPr id="20" name="文本框 19">

</xml_diff>

<commit_message>
test tensor, half experiment good
</commit_message>
<xml_diff>
--- a/notes/组会20220506.pptx
+++ b/notes/组会20220506.pptx
@@ -265,7 +265,7 @@
           <a:p>
             <a:fld id="{3A4C8CEB-F8BF-416D-8039-AAA63E3D103E}" type="datetimeFigureOut">
               <a:rPr lang="zh-CN" altLang="en-US" smtClean="0"/>
-              <a:t>2022/5/6</a:t>
+              <a:t>2022/5/9</a:t>
             </a:fld>
             <a:endParaRPr lang="zh-CN" altLang="en-US"/>
           </a:p>
@@ -463,7 +463,7 @@
           <a:p>
             <a:fld id="{3A4C8CEB-F8BF-416D-8039-AAA63E3D103E}" type="datetimeFigureOut">
               <a:rPr lang="zh-CN" altLang="en-US" smtClean="0"/>
-              <a:t>2022/5/6</a:t>
+              <a:t>2022/5/9</a:t>
             </a:fld>
             <a:endParaRPr lang="zh-CN" altLang="en-US"/>
           </a:p>
@@ -671,7 +671,7 @@
           <a:p>
             <a:fld id="{3A4C8CEB-F8BF-416D-8039-AAA63E3D103E}" type="datetimeFigureOut">
               <a:rPr lang="zh-CN" altLang="en-US" smtClean="0"/>
-              <a:t>2022/5/6</a:t>
+              <a:t>2022/5/9</a:t>
             </a:fld>
             <a:endParaRPr lang="zh-CN" altLang="en-US"/>
           </a:p>
@@ -869,7 +869,7 @@
           <a:p>
             <a:fld id="{3A4C8CEB-F8BF-416D-8039-AAA63E3D103E}" type="datetimeFigureOut">
               <a:rPr lang="zh-CN" altLang="en-US" smtClean="0"/>
-              <a:t>2022/5/6</a:t>
+              <a:t>2022/5/9</a:t>
             </a:fld>
             <a:endParaRPr lang="zh-CN" altLang="en-US"/>
           </a:p>
@@ -1144,7 +1144,7 @@
           <a:p>
             <a:fld id="{3A4C8CEB-F8BF-416D-8039-AAA63E3D103E}" type="datetimeFigureOut">
               <a:rPr lang="zh-CN" altLang="en-US" smtClean="0"/>
-              <a:t>2022/5/6</a:t>
+              <a:t>2022/5/9</a:t>
             </a:fld>
             <a:endParaRPr lang="zh-CN" altLang="en-US"/>
           </a:p>
@@ -1409,7 +1409,7 @@
           <a:p>
             <a:fld id="{3A4C8CEB-F8BF-416D-8039-AAA63E3D103E}" type="datetimeFigureOut">
               <a:rPr lang="zh-CN" altLang="en-US" smtClean="0"/>
-              <a:t>2022/5/6</a:t>
+              <a:t>2022/5/9</a:t>
             </a:fld>
             <a:endParaRPr lang="zh-CN" altLang="en-US"/>
           </a:p>
@@ -1821,7 +1821,7 @@
           <a:p>
             <a:fld id="{3A4C8CEB-F8BF-416D-8039-AAA63E3D103E}" type="datetimeFigureOut">
               <a:rPr lang="zh-CN" altLang="en-US" smtClean="0"/>
-              <a:t>2022/5/6</a:t>
+              <a:t>2022/5/9</a:t>
             </a:fld>
             <a:endParaRPr lang="zh-CN" altLang="en-US"/>
           </a:p>
@@ -1962,7 +1962,7 @@
           <a:p>
             <a:fld id="{3A4C8CEB-F8BF-416D-8039-AAA63E3D103E}" type="datetimeFigureOut">
               <a:rPr lang="zh-CN" altLang="en-US" smtClean="0"/>
-              <a:t>2022/5/6</a:t>
+              <a:t>2022/5/9</a:t>
             </a:fld>
             <a:endParaRPr lang="zh-CN" altLang="en-US"/>
           </a:p>
@@ -2075,7 +2075,7 @@
           <a:p>
             <a:fld id="{3A4C8CEB-F8BF-416D-8039-AAA63E3D103E}" type="datetimeFigureOut">
               <a:rPr lang="zh-CN" altLang="en-US" smtClean="0"/>
-              <a:t>2022/5/6</a:t>
+              <a:t>2022/5/9</a:t>
             </a:fld>
             <a:endParaRPr lang="zh-CN" altLang="en-US"/>
           </a:p>
@@ -2386,7 +2386,7 @@
           <a:p>
             <a:fld id="{3A4C8CEB-F8BF-416D-8039-AAA63E3D103E}" type="datetimeFigureOut">
               <a:rPr lang="zh-CN" altLang="en-US" smtClean="0"/>
-              <a:t>2022/5/6</a:t>
+              <a:t>2022/5/9</a:t>
             </a:fld>
             <a:endParaRPr lang="zh-CN" altLang="en-US"/>
           </a:p>
@@ -2674,7 +2674,7 @@
           <a:p>
             <a:fld id="{3A4C8CEB-F8BF-416D-8039-AAA63E3D103E}" type="datetimeFigureOut">
               <a:rPr lang="zh-CN" altLang="en-US" smtClean="0"/>
-              <a:t>2022/5/6</a:t>
+              <a:t>2022/5/9</a:t>
             </a:fld>
             <a:endParaRPr lang="zh-CN" altLang="en-US"/>
           </a:p>
@@ -2915,7 +2915,7 @@
           <a:p>
             <a:fld id="{3A4C8CEB-F8BF-416D-8039-AAA63E3D103E}" type="datetimeFigureOut">
               <a:rPr lang="zh-CN" altLang="en-US" smtClean="0"/>
-              <a:t>2022/5/6</a:t>
+              <a:t>2022/5/9</a:t>
             </a:fld>
             <a:endParaRPr lang="zh-CN" altLang="en-US"/>
           </a:p>
@@ -4058,10 +4058,9 @@
                     <a:p>
                       <a:pPr algn="ctr"/>
                       <a:r>
-                        <a:rPr lang="en-US" altLang="zh-CN"/>
+                        <a:rPr lang="en-US" altLang="zh-CN" dirty="0"/>
                         <a:t>3.3s </a:t>
                       </a:r>
-                      <a:endParaRPr lang="en-US" altLang="zh-CN" dirty="0"/>
                     </a:p>
                   </a:txBody>
                   <a:tcPr/>
@@ -5925,13 +5924,13 @@
             <p:ph idx="1"/>
             <p:extLst>
               <p:ext uri="{D42A27DB-BD31-4B8C-83A1-F6EECF244321}">
-                <p14:modId xmlns:p14="http://schemas.microsoft.com/office/powerpoint/2010/main" val="28615348"/>
+                <p14:modId xmlns:p14="http://schemas.microsoft.com/office/powerpoint/2010/main" val="2833772989"/>
               </p:ext>
             </p:extLst>
           </p:nvPr>
         </p:nvGraphicFramePr>
         <p:xfrm>
-          <a:off x="693420" y="1457005"/>
+          <a:off x="743524" y="1330325"/>
           <a:ext cx="10515600" cy="4197350"/>
         </p:xfrm>
         <a:graphic>

</xml_diff>